<commit_message>
update all over the place
</commit_message>
<xml_diff>
--- a/Presentation/MottiAppPresentation.pptx
+++ b/Presentation/MottiAppPresentation.pptx
@@ -5,7 +5,7 @@
     <p:sldMasterId id="2147483672" r:id="rId1"/>
   </p:sldMasterIdLst>
   <p:notesMasterIdLst>
-    <p:notesMasterId r:id="rId11"/>
+    <p:notesMasterId r:id="rId10"/>
   </p:notesMasterIdLst>
   <p:sldIdLst>
     <p:sldId id="256" r:id="rId2"/>
@@ -14,9 +14,8 @@
     <p:sldId id="259" r:id="rId5"/>
     <p:sldId id="260" r:id="rId6"/>
     <p:sldId id="261" r:id="rId7"/>
-    <p:sldId id="262" r:id="rId8"/>
-    <p:sldId id="263" r:id="rId9"/>
-    <p:sldId id="264" r:id="rId10"/>
+    <p:sldId id="263" r:id="rId8"/>
+    <p:sldId id="264" r:id="rId9"/>
   </p:sldIdLst>
   <p:sldSz cx="9144000" cy="6858000" type="screen4x3"/>
   <p:notesSz cx="6858000" cy="9144000"/>
@@ -115,6 +114,22 @@
       </a:defRPr>
     </a:lvl9pPr>
   </p:defaultTextStyle>
+  <p:extLst>
+    <p:ext uri="{EFAFB233-063F-42B5-8137-9DF3F51BA10A}">
+      <p15:sldGuideLst xmlns:p15="http://schemas.microsoft.com/office/powerpoint/2012/main">
+        <p15:guide id="1" orient="horz" pos="2160">
+          <p15:clr>
+            <a:srgbClr val="A4A3A4"/>
+          </p15:clr>
+        </p15:guide>
+        <p15:guide id="2" pos="2880">
+          <p15:clr>
+            <a:srgbClr val="A4A3A4"/>
+          </p15:clr>
+        </p15:guide>
+      </p15:sldGuideLst>
+    </p:ext>
+  </p:extLst>
 </p:presentation>
 </file>
 
@@ -6181,268 +6196,6 @@
           <a:bodyPr/>
           <a:lstStyle/>
           <a:p>
-            <a:endParaRPr lang="nl-NL" dirty="0" smtClean="0"/>
-          </a:p>
-          <a:p>
-            <a:r>
-              <a:rPr lang="en-US" dirty="0"/>
-              <a:t>W</a:t>
-            </a:r>
-            <a:r>
-              <a:rPr lang="en-US" dirty="0" smtClean="0"/>
-              <a:t>orkflow: </a:t>
-            </a:r>
-            <a:endParaRPr lang="nl-NL" dirty="0"/>
-          </a:p>
-          <a:p>
-            <a:pPr lvl="1"/>
-            <a:r>
-              <a:rPr lang="en-US" dirty="0"/>
-              <a:t>Make a username</a:t>
-            </a:r>
-            <a:endParaRPr lang="nl-NL" dirty="0"/>
-          </a:p>
-          <a:p>
-            <a:pPr lvl="1"/>
-            <a:r>
-              <a:rPr lang="en-US" dirty="0"/>
-              <a:t>Set your goals and sub-goals with a duration</a:t>
-            </a:r>
-            <a:endParaRPr lang="nl-NL" dirty="0"/>
-          </a:p>
-          <a:p>
-            <a:pPr lvl="1"/>
-            <a:r>
-              <a:rPr lang="en-US" dirty="0"/>
-              <a:t>Receive coins for step 2</a:t>
-            </a:r>
-            <a:endParaRPr lang="nl-NL" dirty="0"/>
-          </a:p>
-          <a:p>
-            <a:pPr lvl="1"/>
-            <a:r>
-              <a:rPr lang="en-US" dirty="0"/>
-              <a:t>Use your coins to spin the wheel of fortune</a:t>
-            </a:r>
-            <a:endParaRPr lang="nl-NL" dirty="0"/>
-          </a:p>
-          <a:p>
-            <a:pPr lvl="1"/>
-            <a:r>
-              <a:rPr lang="en-US" dirty="0"/>
-              <a:t>Experience the different slots of the wheel</a:t>
-            </a:r>
-            <a:endParaRPr lang="nl-NL" dirty="0"/>
-          </a:p>
-          <a:p>
-            <a:pPr lvl="1"/>
-            <a:r>
-              <a:rPr lang="en-US" dirty="0"/>
-              <a:t>Get notification when a goal or sub-goals triggers</a:t>
-            </a:r>
-            <a:endParaRPr lang="nl-NL" dirty="0"/>
-          </a:p>
-          <a:p>
-            <a:pPr lvl="1"/>
-            <a:r>
-              <a:rPr lang="en-US" dirty="0"/>
-              <a:t>Keep track of your Progress </a:t>
-            </a:r>
-            <a:endParaRPr lang="nl-NL" dirty="0"/>
-          </a:p>
-          <a:p>
-            <a:pPr lvl="1"/>
-            <a:endParaRPr lang="nl-NL" dirty="0"/>
-          </a:p>
-        </p:txBody>
-      </p:sp>
-      <p:pic>
-        <p:nvPicPr>
-          <p:cNvPr id="4" name="Picture 3" descr="C:\Users\Ruud\Documents\GitHub\HackathonMasters2016\Motti\logo\team.jpg"/>
-          <p:cNvPicPr>
-            <a:picLocks noChangeAspect="1" noChangeArrowheads="1"/>
-          </p:cNvPicPr>
-          <p:nvPr/>
-        </p:nvPicPr>
-        <p:blipFill>
-          <a:blip r:embed="rId2">
-            <a:extLst>
-              <a:ext uri="{BEBA8EAE-BF5A-486C-A8C5-ECC9F3942E4B}">
-                <a14:imgProps xmlns:a14="http://schemas.microsoft.com/office/drawing/2010/main">
-                  <a14:imgLayer r:embed="rId3">
-                    <a14:imgEffect>
-                      <a14:artisticMarker trans="35000"/>
-                    </a14:imgEffect>
-                  </a14:imgLayer>
-                </a14:imgProps>
-              </a:ext>
-              <a:ext uri="{28A0092B-C50C-407E-A947-70E740481C1C}">
-                <a14:useLocalDpi xmlns:a14="http://schemas.microsoft.com/office/drawing/2010/main" val="0"/>
-              </a:ext>
-            </a:extLst>
-          </a:blip>
-          <a:srcRect/>
-          <a:stretch>
-            <a:fillRect/>
-          </a:stretch>
-        </p:blipFill>
-        <p:spPr bwMode="auto">
-          <a:xfrm>
-            <a:off x="7380312" y="5733256"/>
-            <a:ext cx="1190625" cy="847725"/>
-          </a:xfrm>
-          <a:prstGeom prst="rect">
-            <a:avLst/>
-          </a:prstGeom>
-          <a:noFill/>
-          <a:ln>
-            <a:noFill/>
-          </a:ln>
-          <a:effectLst>
-            <a:outerShdw blurRad="127000" dist="38100" dir="2700000" algn="ctr">
-              <a:srgbClr val="000000">
-                <a:alpha val="45000"/>
-              </a:srgbClr>
-            </a:outerShdw>
-          </a:effectLst>
-          <a:scene3d>
-            <a:camera prst="perspectiveFront" fov="2700000">
-              <a:rot lat="20376000" lon="1938000" rev="20112001"/>
-            </a:camera>
-            <a:lightRig rig="soft" dir="t">
-              <a:rot lat="0" lon="0" rev="0"/>
-            </a:lightRig>
-          </a:scene3d>
-          <a:sp3d prstMaterial="translucentPowder">
-            <a:bevelT w="203200" h="50800" prst="softRound"/>
-          </a:sp3d>
-          <a:extLst>
-            <a:ext uri="{909E8E84-426E-40DD-AFC4-6F175D3DCCD1}">
-              <a14:hiddenFill xmlns:a14="http://schemas.microsoft.com/office/drawing/2010/main">
-                <a:solidFill>
-                  <a:srgbClr val="FFFFFF"/>
-                </a:solidFill>
-              </a14:hiddenFill>
-            </a:ext>
-          </a:extLst>
-        </p:spPr>
-      </p:pic>
-      <p:pic>
-        <p:nvPicPr>
-          <p:cNvPr id="7170" name="Picture 2" descr="C:\Users\Ruud\Desktop\School\Presentation Pics\solution2.jpg"/>
-          <p:cNvPicPr>
-            <a:picLocks noChangeAspect="1" noChangeArrowheads="1"/>
-          </p:cNvPicPr>
-          <p:nvPr/>
-        </p:nvPicPr>
-        <p:blipFill>
-          <a:blip r:embed="rId4">
-            <a:extLst>
-              <a:ext uri="{28A0092B-C50C-407E-A947-70E740481C1C}">
-                <a14:useLocalDpi xmlns:a14="http://schemas.microsoft.com/office/drawing/2010/main" val="0"/>
-              </a:ext>
-            </a:extLst>
-          </a:blip>
-          <a:srcRect/>
-          <a:stretch>
-            <a:fillRect/>
-          </a:stretch>
-        </p:blipFill>
-        <p:spPr bwMode="auto">
-          <a:xfrm>
-            <a:off x="5800725" y="2132856"/>
-            <a:ext cx="2457450" cy="1857375"/>
-          </a:xfrm>
-          <a:prstGeom prst="rect">
-            <a:avLst/>
-          </a:prstGeom>
-          <a:noFill/>
-          <a:extLst>
-            <a:ext uri="{909E8E84-426E-40DD-AFC4-6F175D3DCCD1}">
-              <a14:hiddenFill xmlns:a14="http://schemas.microsoft.com/office/drawing/2010/main">
-                <a:solidFill>
-                  <a:srgbClr val="FFFFFF"/>
-                </a:solidFill>
-              </a14:hiddenFill>
-            </a:ext>
-          </a:extLst>
-        </p:spPr>
-      </p:pic>
-    </p:spTree>
-    <p:extLst>
-      <p:ext uri="{BB962C8B-B14F-4D97-AF65-F5344CB8AC3E}">
-        <p14:creationId xmlns:p14="http://schemas.microsoft.com/office/powerpoint/2010/main" val="1253196595"/>
-      </p:ext>
-    </p:extLst>
-  </p:cSld>
-  <p:clrMapOvr>
-    <a:masterClrMapping/>
-  </p:clrMapOvr>
-  <p:timing>
-    <p:tnLst>
-      <p:par>
-        <p:cTn id="1" dur="indefinite" restart="never" nodeType="tmRoot"/>
-      </p:par>
-    </p:tnLst>
-  </p:timing>
-</p:sld>
-</file>
-
-<file path=ppt/slides/slide8.xml><?xml version="1.0" encoding="utf-8"?>
-<p:sld xmlns:a="http://schemas.openxmlformats.org/drawingml/2006/main" xmlns:r="http://schemas.openxmlformats.org/officeDocument/2006/relationships" xmlns:p="http://schemas.openxmlformats.org/presentationml/2006/main">
-  <p:cSld>
-    <p:spTree>
-      <p:nvGrpSpPr>
-        <p:cNvPr id="1" name=""/>
-        <p:cNvGrpSpPr/>
-        <p:nvPr/>
-      </p:nvGrpSpPr>
-      <p:grpSpPr>
-        <a:xfrm>
-          <a:off x="0" y="0"/>
-          <a:ext cx="0" cy="0"/>
-          <a:chOff x="0" y="0"/>
-          <a:chExt cx="0" cy="0"/>
-        </a:xfrm>
-      </p:grpSpPr>
-      <p:sp>
-        <p:nvSpPr>
-          <p:cNvPr id="2" name="Title 1"/>
-          <p:cNvSpPr>
-            <a:spLocks noGrp="1"/>
-          </p:cNvSpPr>
-          <p:nvPr>
-            <p:ph type="title"/>
-          </p:nvPr>
-        </p:nvSpPr>
-        <p:spPr/>
-        <p:txBody>
-          <a:bodyPr/>
-          <a:lstStyle/>
-          <a:p>
-            <a:r>
-              <a:rPr lang="nl-NL" dirty="0" smtClean="0"/>
-              <a:t>Continued...</a:t>
-            </a:r>
-            <a:endParaRPr lang="nl-NL" dirty="0"/>
-          </a:p>
-        </p:txBody>
-      </p:sp>
-      <p:sp>
-        <p:nvSpPr>
-          <p:cNvPr id="3" name="Content Placeholder 2"/>
-          <p:cNvSpPr>
-            <a:spLocks noGrp="1"/>
-          </p:cNvSpPr>
-          <p:nvPr>
-            <p:ph idx="1"/>
-          </p:nvPr>
-        </p:nvSpPr>
-        <p:spPr/>
-        <p:txBody>
-          <a:bodyPr/>
-          <a:lstStyle/>
-          <a:p>
             <a:endParaRPr lang="en-US" dirty="0" smtClean="0"/>
           </a:p>
           <a:p>
@@ -6625,7 +6378,7 @@
 </p:sld>
 </file>
 
-<file path=ppt/slides/slide9.xml><?xml version="1.0" encoding="utf-8"?>
+<file path=ppt/slides/slide8.xml><?xml version="1.0" encoding="utf-8"?>
 <p:sld xmlns:a="http://schemas.openxmlformats.org/drawingml/2006/main" xmlns:r="http://schemas.openxmlformats.org/officeDocument/2006/relationships" xmlns:p="http://schemas.openxmlformats.org/presentationml/2006/main">
   <p:cSld>
     <p:spTree>

</xml_diff>